<commit_message>
Update day 3 contents
</commit_message>
<xml_diff>
--- a/PPT/PyQt5를 이용한 GUI 프로그래밍 02.pptx
+++ b/PPT/PyQt5를 이용한 GUI 프로그래밍 02.pptx
@@ -225,7 +225,7 @@
           <a:p>
             <a:fld id="{CDA69884-0459-4538-A815-5CAB5C172DE3}" type="datetimeFigureOut">
               <a:rPr lang="ko-KR" altLang="en-US" smtClean="0"/>
-              <a:t>2021-01-20</a:t>
+              <a:t>2021-01-22</a:t>
             </a:fld>
             <a:endParaRPr lang="ko-KR" altLang="en-US"/>
           </a:p>
@@ -643,7 +643,7 @@
           <a:p>
             <a:fld id="{6D1E8B6A-FC58-4B22-822E-7F0C2F19AC93}" type="datetime1">
               <a:rPr lang="ko-KR" altLang="en-US" smtClean="0"/>
-              <a:t>2021-01-20</a:t>
+              <a:t>2021-01-22</a:t>
             </a:fld>
             <a:endParaRPr lang="ko-KR" altLang="en-US"/>
           </a:p>
@@ -996,7 +996,7 @@
           <a:p>
             <a:fld id="{6CDA57B6-AD91-4EE6-8307-BDD8AFE8465B}" type="datetime1">
               <a:rPr lang="ko-KR" altLang="en-US" smtClean="0"/>
-              <a:t>2021-01-20</a:t>
+              <a:t>2021-01-22</a:t>
             </a:fld>
             <a:endParaRPr lang="ko-KR" altLang="en-US"/>
           </a:p>
@@ -1204,7 +1204,7 @@
           <a:p>
             <a:fld id="{6FCFB8F9-A2D1-4CDD-8EA0-9443D9809EB6}" type="datetime1">
               <a:rPr lang="ko-KR" altLang="en-US" smtClean="0"/>
-              <a:t>2021-01-20</a:t>
+              <a:t>2021-01-22</a:t>
             </a:fld>
             <a:endParaRPr lang="ko-KR" altLang="en-US"/>
           </a:p>
@@ -1405,7 +1405,7 @@
           <a:p>
             <a:fld id="{EC030C3A-E902-47A9-BA9C-11978B5A3E10}" type="datetime1">
               <a:rPr lang="ko-KR" altLang="en-US" smtClean="0"/>
-              <a:t>2021-01-20</a:t>
+              <a:t>2021-01-22</a:t>
             </a:fld>
             <a:endParaRPr lang="ko-KR" altLang="en-US"/>
           </a:p>
@@ -1664,7 +1664,7 @@
           <a:p>
             <a:fld id="{8DB39BE6-B813-4A5C-8A37-A6914B452DC7}" type="datetime1">
               <a:rPr lang="ko-KR" altLang="en-US" smtClean="0"/>
-              <a:t>2021-01-20</a:t>
+              <a:t>2021-01-22</a:t>
             </a:fld>
             <a:endParaRPr lang="ko-KR" altLang="en-US"/>
           </a:p>
@@ -2296,7 +2296,7 @@
           <a:p>
             <a:fld id="{13B7845C-8DCF-4F56-9592-C5B4538B2D59}" type="datetime1">
               <a:rPr lang="ko-KR" altLang="en-US" smtClean="0"/>
-              <a:t>2021-01-20</a:t>
+              <a:t>2021-01-22</a:t>
             </a:fld>
             <a:endParaRPr lang="ko-KR" altLang="en-US"/>
           </a:p>
@@ -2708,7 +2708,7 @@
           <a:p>
             <a:fld id="{34599A19-BC3A-4199-AF4A-F4A516DD9F70}" type="datetime1">
               <a:rPr lang="ko-KR" altLang="en-US" smtClean="0"/>
-              <a:t>2021-01-20</a:t>
+              <a:t>2021-01-22</a:t>
             </a:fld>
             <a:endParaRPr lang="ko-KR" altLang="en-US"/>
           </a:p>
@@ -2849,7 +2849,7 @@
           <a:p>
             <a:fld id="{584E885B-2EEC-481A-B44F-181BECED58AA}" type="datetime1">
               <a:rPr lang="ko-KR" altLang="en-US" smtClean="0"/>
-              <a:t>2021-01-20</a:t>
+              <a:t>2021-01-22</a:t>
             </a:fld>
             <a:endParaRPr lang="ko-KR" altLang="en-US"/>
           </a:p>
@@ -3160,7 +3160,7 @@
           <a:p>
             <a:fld id="{6C2B06BA-3133-4624-B79F-FF22349E2C1E}" type="datetime1">
               <a:rPr lang="ko-KR" altLang="en-US" smtClean="0"/>
-              <a:t>2021-01-20</a:t>
+              <a:t>2021-01-22</a:t>
             </a:fld>
             <a:endParaRPr lang="ko-KR" altLang="en-US"/>
           </a:p>
@@ -3448,7 +3448,7 @@
           <a:p>
             <a:fld id="{E47BD7D1-EFD3-44A1-95BF-8EB6FF3658EA}" type="datetime1">
               <a:rPr lang="ko-KR" altLang="en-US" smtClean="0"/>
-              <a:t>2021-01-20</a:t>
+              <a:t>2021-01-22</a:t>
             </a:fld>
             <a:endParaRPr lang="ko-KR" altLang="en-US"/>
           </a:p>
@@ -3689,7 +3689,7 @@
           <a:p>
             <a:fld id="{6589BD89-8927-409C-83EE-D99DFD6DFDE6}" type="datetime1">
               <a:rPr lang="ko-KR" altLang="en-US" smtClean="0"/>
-              <a:t>2021-01-20</a:t>
+              <a:t>2021-01-22</a:t>
             </a:fld>
             <a:endParaRPr lang="ko-KR" altLang="en-US"/>
           </a:p>

</xml_diff>